<commit_message>
adding numbering in readme file
</commit_message>
<xml_diff>
--- a/Presentation.pptx
+++ b/Presentation.pptx
@@ -5,8 +5,8 @@
     <p:sldMasterId id="2147483648" r:id="rId1"/>
   </p:sldMasterIdLst>
   <p:sldIdLst>
-    <p:sldId id="256" r:id="rId2"/>
-    <p:sldId id="257" r:id="rId3"/>
+    <p:sldId id="257" r:id="rId2"/>
+    <p:sldId id="258" r:id="rId3"/>
   </p:sldIdLst>
   <p:sldSz cx="12192000" cy="6858000"/>
   <p:notesSz cx="6858000" cy="9144000"/>
@@ -105,6 +105,11 @@
       </a:defRPr>
     </a:lvl9pPr>
   </p:defaultTextStyle>
+  <p:extLst>
+    <p:ext uri="{EFAFB233-063F-42B5-8137-9DF3F51BA10A}">
+      <p15:sldGuideLst xmlns:p15="http://schemas.microsoft.com/office/powerpoint/2012/main"/>
+    </p:ext>
+  </p:extLst>
 </p:presentation>
 </file>
 
@@ -255,7 +260,7 @@
           <a:p>
             <a:fld id="{63839D75-8C84-4947-B1BE-233B44B55150}" type="datetimeFigureOut">
               <a:rPr lang="en-US" smtClean="0"/>
-              <a:t>7/22/2025</a:t>
+              <a:t>7/23/2025</a:t>
             </a:fld>
             <a:endParaRPr lang="en-US"/>
           </a:p>
@@ -453,7 +458,7 @@
           <a:p>
             <a:fld id="{63839D75-8C84-4947-B1BE-233B44B55150}" type="datetimeFigureOut">
               <a:rPr lang="en-US" smtClean="0"/>
-              <a:t>7/22/2025</a:t>
+              <a:t>7/23/2025</a:t>
             </a:fld>
             <a:endParaRPr lang="en-US"/>
           </a:p>
@@ -661,7 +666,7 @@
           <a:p>
             <a:fld id="{63839D75-8C84-4947-B1BE-233B44B55150}" type="datetimeFigureOut">
               <a:rPr lang="en-US" smtClean="0"/>
-              <a:t>7/22/2025</a:t>
+              <a:t>7/23/2025</a:t>
             </a:fld>
             <a:endParaRPr lang="en-US"/>
           </a:p>
@@ -859,7 +864,7 @@
           <a:p>
             <a:fld id="{63839D75-8C84-4947-B1BE-233B44B55150}" type="datetimeFigureOut">
               <a:rPr lang="en-US" smtClean="0"/>
-              <a:t>7/22/2025</a:t>
+              <a:t>7/23/2025</a:t>
             </a:fld>
             <a:endParaRPr lang="en-US"/>
           </a:p>
@@ -1134,7 +1139,7 @@
           <a:p>
             <a:fld id="{63839D75-8C84-4947-B1BE-233B44B55150}" type="datetimeFigureOut">
               <a:rPr lang="en-US" smtClean="0"/>
-              <a:t>7/22/2025</a:t>
+              <a:t>7/23/2025</a:t>
             </a:fld>
             <a:endParaRPr lang="en-US"/>
           </a:p>
@@ -1399,7 +1404,7 @@
           <a:p>
             <a:fld id="{63839D75-8C84-4947-B1BE-233B44B55150}" type="datetimeFigureOut">
               <a:rPr lang="en-US" smtClean="0"/>
-              <a:t>7/22/2025</a:t>
+              <a:t>7/23/2025</a:t>
             </a:fld>
             <a:endParaRPr lang="en-US"/>
           </a:p>
@@ -1811,7 +1816,7 @@
           <a:p>
             <a:fld id="{63839D75-8C84-4947-B1BE-233B44B55150}" type="datetimeFigureOut">
               <a:rPr lang="en-US" smtClean="0"/>
-              <a:t>7/22/2025</a:t>
+              <a:t>7/23/2025</a:t>
             </a:fld>
             <a:endParaRPr lang="en-US"/>
           </a:p>
@@ -1952,7 +1957,7 @@
           <a:p>
             <a:fld id="{63839D75-8C84-4947-B1BE-233B44B55150}" type="datetimeFigureOut">
               <a:rPr lang="en-US" smtClean="0"/>
-              <a:t>7/22/2025</a:t>
+              <a:t>7/23/2025</a:t>
             </a:fld>
             <a:endParaRPr lang="en-US"/>
           </a:p>
@@ -2065,7 +2070,7 @@
           <a:p>
             <a:fld id="{63839D75-8C84-4947-B1BE-233B44B55150}" type="datetimeFigureOut">
               <a:rPr lang="en-US" smtClean="0"/>
-              <a:t>7/22/2025</a:t>
+              <a:t>7/23/2025</a:t>
             </a:fld>
             <a:endParaRPr lang="en-US"/>
           </a:p>
@@ -2376,7 +2381,7 @@
           <a:p>
             <a:fld id="{63839D75-8C84-4947-B1BE-233B44B55150}" type="datetimeFigureOut">
               <a:rPr lang="en-US" smtClean="0"/>
-              <a:t>7/22/2025</a:t>
+              <a:t>7/23/2025</a:t>
             </a:fld>
             <a:endParaRPr lang="en-US"/>
           </a:p>
@@ -2664,7 +2669,7 @@
           <a:p>
             <a:fld id="{63839D75-8C84-4947-B1BE-233B44B55150}" type="datetimeFigureOut">
               <a:rPr lang="en-US" smtClean="0"/>
-              <a:t>7/22/2025</a:t>
+              <a:t>7/23/2025</a:t>
             </a:fld>
             <a:endParaRPr lang="en-US"/>
           </a:p>
@@ -2905,7 +2910,7 @@
           <a:p>
             <a:fld id="{63839D75-8C84-4947-B1BE-233B44B55150}" type="datetimeFigureOut">
               <a:rPr lang="en-US" smtClean="0"/>
-              <a:t>7/22/2025</a:t>
+              <a:t>7/23/2025</a:t>
             </a:fld>
             <a:endParaRPr lang="en-US"/>
           </a:p>
@@ -3327,22 +3332,20 @@
           <p:cNvPr id="2" name="Title 1">
             <a:extLst>
               <a:ext uri="{FF2B5EF4-FFF2-40B4-BE49-F238E27FC236}">
-                <a16:creationId xmlns:a16="http://schemas.microsoft.com/office/drawing/2014/main" id="{DFA9E4B9-53C3-4A36-8982-E9F079ECA1E6}"/>
-              </a:ext>
-            </a:extLst>
-          </p:cNvPr>
-          <p:cNvSpPr>
-            <a:spLocks noGrp="1"/>
-          </p:cNvSpPr>
-          <p:nvPr>
-            <p:ph type="ctrTitle"/>
-          </p:nvPr>
-        </p:nvSpPr>
-        <p:spPr/>
-        <p:txBody>
-          <a:bodyPr>
-            <a:normAutofit fontScale="90000"/>
-          </a:bodyPr>
+                <a16:creationId xmlns:a16="http://schemas.microsoft.com/office/drawing/2014/main" id="{C1219A60-38DB-40FB-A66E-090528AEDDA3}"/>
+              </a:ext>
+            </a:extLst>
+          </p:cNvPr>
+          <p:cNvSpPr>
+            <a:spLocks noGrp="1"/>
+          </p:cNvSpPr>
+          <p:nvPr>
+            <p:ph type="title"/>
+          </p:nvPr>
+        </p:nvSpPr>
+        <p:spPr/>
+        <p:txBody>
+          <a:bodyPr/>
           <a:lstStyle/>
           <a:p>
             <a:r>
@@ -3353,74 +3356,27 @@
                 <a:effectLst/>
                 <a:latin typeface="-apple-system"/>
               </a:rPr>
-              <a:t>Customer Churn Prediction for </a:t>
-            </a:r>
-            <a:r>
-              <a:rPr lang="en-US" b="1" i="0" dirty="0" err="1">
-                <a:solidFill>
-                  <a:srgbClr val="1F2328"/>
-                </a:solidFill>
-                <a:effectLst/>
-                <a:latin typeface="-apple-system"/>
-              </a:rPr>
-              <a:t>SyriaTel</a:t>
-            </a:r>
-            <a:br>
-              <a:rPr lang="en-US" b="1" i="0" dirty="0">
-                <a:solidFill>
-                  <a:srgbClr val="1F2328"/>
-                </a:solidFill>
-                <a:effectLst/>
-                <a:latin typeface="-apple-system"/>
-              </a:rPr>
-            </a:br>
-            <a:endParaRPr lang="en-US" dirty="0"/>
-          </a:p>
-        </p:txBody>
-      </p:sp>
-      <p:sp>
-        <p:nvSpPr>
-          <p:cNvPr id="3" name="Subtitle 2">
-            <a:extLst>
-              <a:ext uri="{FF2B5EF4-FFF2-40B4-BE49-F238E27FC236}">
-                <a16:creationId xmlns:a16="http://schemas.microsoft.com/office/drawing/2014/main" id="{908D97CF-D24A-4D51-BA33-2DF5B6A547A6}"/>
-              </a:ext>
-            </a:extLst>
-          </p:cNvPr>
-          <p:cNvSpPr>
-            <a:spLocks noGrp="1"/>
-          </p:cNvSpPr>
-          <p:nvPr>
-            <p:ph type="subTitle" idx="1"/>
-          </p:nvPr>
-        </p:nvSpPr>
-        <p:spPr>
-          <a:xfrm>
-            <a:off x="887896" y="4834490"/>
-            <a:ext cx="9144000" cy="1655762"/>
-          </a:xfrm>
-        </p:spPr>
-        <p:txBody>
-          <a:bodyPr/>
-          <a:lstStyle/>
-          <a:p>
+              <a:t>Customer Churn Prediction for SyriaTel</a:t>
+            </a:r>
             <a:endParaRPr lang="en-US" dirty="0"/>
           </a:p>
         </p:txBody>
       </p:sp>
       <p:pic>
         <p:nvPicPr>
-          <p:cNvPr id="1026" name="Picture 2" descr="2+ Hundred Customer Churn Rate Royalty-Free Images, Stock Photos &amp; Pictures  | Shutterstock">
-            <a:extLst>
-              <a:ext uri="{FF2B5EF4-FFF2-40B4-BE49-F238E27FC236}">
-                <a16:creationId xmlns:a16="http://schemas.microsoft.com/office/drawing/2014/main" id="{76FADFC8-4F8A-47BD-B82A-2B303C11D8F5}"/>
+          <p:cNvPr id="5" name="Content Placeholder 4">
+            <a:extLst>
+              <a:ext uri="{FF2B5EF4-FFF2-40B4-BE49-F238E27FC236}">
+                <a16:creationId xmlns:a16="http://schemas.microsoft.com/office/drawing/2014/main" id="{C5904921-4F37-41CF-BC97-C0F88CFE02A9}"/>
               </a:ext>
             </a:extLst>
           </p:cNvPr>
           <p:cNvPicPr>
-            <a:picLocks noChangeAspect="1" noChangeArrowheads="1"/>
+            <a:picLocks noGrp="1" noChangeAspect="1"/>
           </p:cNvPicPr>
-          <p:nvPr/>
+          <p:nvPr>
+            <p:ph idx="1"/>
+          </p:nvPr>
         </p:nvPicPr>
         <p:blipFill>
           <a:blip r:embed="rId2">
@@ -3430,35 +3386,21 @@
               </a:ext>
             </a:extLst>
           </a:blip>
-          <a:srcRect/>
           <a:stretch>
             <a:fillRect/>
           </a:stretch>
         </p:blipFill>
-        <p:spPr bwMode="auto">
+        <p:spPr>
           <a:xfrm>
-            <a:off x="2602396" y="2756452"/>
-            <a:ext cx="5715000" cy="3810000"/>
+            <a:off x="838200" y="1537252"/>
+            <a:ext cx="10164417" cy="4955623"/>
           </a:xfrm>
-          <a:prstGeom prst="rect">
-            <a:avLst/>
-          </a:prstGeom>
-          <a:noFill/>
-          <a:extLst>
-            <a:ext uri="{909E8E84-426E-40DD-AFC4-6F175D3DCCD1}">
-              <a14:hiddenFill xmlns:a14="http://schemas.microsoft.com/office/drawing/2010/main">
-                <a:solidFill>
-                  <a:srgbClr val="FFFFFF"/>
-                </a:solidFill>
-              </a14:hiddenFill>
-            </a:ext>
-          </a:extLst>
         </p:spPr>
       </p:pic>
     </p:spTree>
     <p:extLst>
       <p:ext uri="{BB962C8B-B14F-4D97-AF65-F5344CB8AC3E}">
-        <p14:creationId xmlns:p14="http://schemas.microsoft.com/office/powerpoint/2010/main" val="403827897"/>
+        <p14:creationId xmlns:p14="http://schemas.microsoft.com/office/powerpoint/2010/main" val="820051872"/>
       </p:ext>
     </p:extLst>
   </p:cSld>
@@ -3490,7 +3432,7 @@
           <p:cNvPr id="2" name="Title 1">
             <a:extLst>
               <a:ext uri="{FF2B5EF4-FFF2-40B4-BE49-F238E27FC236}">
-                <a16:creationId xmlns:a16="http://schemas.microsoft.com/office/drawing/2014/main" id="{C1219A60-38DB-40FB-A66E-090528AEDDA3}"/>
+                <a16:creationId xmlns:a16="http://schemas.microsoft.com/office/drawing/2014/main" id="{01FADDB0-C5A7-43BE-B58B-77207C7A102D}"/>
               </a:ext>
             </a:extLst>
           </p:cNvPr>
@@ -3506,7 +3448,10 @@
           <a:bodyPr/>
           <a:lstStyle/>
           <a:p>
-            <a:endParaRPr lang="en-US"/>
+            <a:r>
+              <a:rPr lang="en-US" dirty="0"/>
+              <a:t>Business Understanding</a:t>
+            </a:r>
           </a:p>
         </p:txBody>
       </p:sp>
@@ -3515,30 +3460,149 @@
           <p:cNvPr id="3" name="Content Placeholder 2">
             <a:extLst>
               <a:ext uri="{FF2B5EF4-FFF2-40B4-BE49-F238E27FC236}">
-                <a16:creationId xmlns:a16="http://schemas.microsoft.com/office/drawing/2014/main" id="{6DA2DEA9-F7BA-49C7-B380-56A2922E1A3E}"/>
-              </a:ext>
-            </a:extLst>
-          </p:cNvPr>
-          <p:cNvSpPr>
-            <a:spLocks noGrp="1"/>
-          </p:cNvSpPr>
-          <p:nvPr>
-            <p:ph idx="1"/>
-          </p:nvPr>
-        </p:nvSpPr>
-        <p:spPr/>
-        <p:txBody>
-          <a:bodyPr/>
-          <a:lstStyle/>
-          <a:p>
-            <a:endParaRPr lang="en-US"/>
+                <a16:creationId xmlns:a16="http://schemas.microsoft.com/office/drawing/2014/main" id="{C4C74B38-4EEA-4752-909E-A7CE33B79DE3}"/>
+              </a:ext>
+            </a:extLst>
+          </p:cNvPr>
+          <p:cNvSpPr>
+            <a:spLocks noGrp="1"/>
+          </p:cNvSpPr>
+          <p:nvPr>
+            <p:ph sz="half" idx="1"/>
+          </p:nvPr>
+        </p:nvSpPr>
+        <p:spPr/>
+        <p:txBody>
+          <a:bodyPr>
+            <a:normAutofit fontScale="85000" lnSpcReduction="20000"/>
+          </a:bodyPr>
+          <a:lstStyle/>
+          <a:p>
+            <a:pPr algn="l"/>
+            <a:r>
+              <a:rPr lang="en-US" b="0" i="0" dirty="0">
+                <a:effectLst/>
+                <a:latin typeface="Arial" panose="020B0604020202020204" pitchFamily="34" charset="0"/>
+                <a:cs typeface="Arial" panose="020B0604020202020204" pitchFamily="34" charset="0"/>
+              </a:rPr>
+              <a:t>SyriaTel, like many telecom providers, operates in a highly competitive industry where retaining existing customers is often more cost-effective than acquiring new ones. Customer churn — when subscribers stop using the service — directly impacts revenue and long-term profitability.</a:t>
+            </a:r>
+          </a:p>
+          <a:p>
+            <a:pPr algn="l"/>
+            <a:r>
+              <a:rPr lang="en-US" b="0" i="0" dirty="0">
+                <a:effectLst/>
+                <a:latin typeface="Arial" panose="020B0604020202020204" pitchFamily="34" charset="0"/>
+                <a:cs typeface="Arial" panose="020B0604020202020204" pitchFamily="34" charset="0"/>
+              </a:rPr>
+              <a:t>The challenge is that churn doesn't usually happen randomly. It can result from dissatisfaction with service quality, pricing, customer support, or competitors' offers.</a:t>
+            </a:r>
+          </a:p>
+          <a:p>
+            <a:endParaRPr lang="en-US" dirty="0"/>
+          </a:p>
+        </p:txBody>
+      </p:sp>
+      <p:sp>
+        <p:nvSpPr>
+          <p:cNvPr id="4" name="Content Placeholder 3">
+            <a:extLst>
+              <a:ext uri="{FF2B5EF4-FFF2-40B4-BE49-F238E27FC236}">
+                <a16:creationId xmlns:a16="http://schemas.microsoft.com/office/drawing/2014/main" id="{0A7C95C3-6259-4C9E-8642-6827E15D5A01}"/>
+              </a:ext>
+            </a:extLst>
+          </p:cNvPr>
+          <p:cNvSpPr>
+            <a:spLocks noGrp="1"/>
+          </p:cNvSpPr>
+          <p:nvPr>
+            <p:ph sz="half" idx="2"/>
+          </p:nvPr>
+        </p:nvSpPr>
+        <p:spPr/>
+        <p:txBody>
+          <a:bodyPr>
+            <a:normAutofit fontScale="85000" lnSpcReduction="20000"/>
+          </a:bodyPr>
+          <a:lstStyle/>
+          <a:p>
+            <a:pPr algn="l"/>
+            <a:r>
+              <a:rPr lang="en-US" b="0" i="0" dirty="0">
+                <a:effectLst/>
+                <a:latin typeface="system-ui"/>
+              </a:rPr>
+              <a:t>2. Business Goal</a:t>
+            </a:r>
+          </a:p>
+          <a:p>
+            <a:pPr algn="l"/>
+            <a:endParaRPr lang="en-US" b="0" i="0" dirty="0">
+              <a:effectLst/>
+              <a:latin typeface="system-ui"/>
+            </a:endParaRPr>
+          </a:p>
+          <a:p>
+            <a:pPr algn="l"/>
+            <a:r>
+              <a:rPr lang="en-US" b="0" i="0" dirty="0" err="1">
+                <a:effectLst/>
+                <a:latin typeface="system-ui"/>
+              </a:rPr>
+              <a:t>i</a:t>
+            </a:r>
+            <a:r>
+              <a:rPr lang="en-US" b="0" i="0" dirty="0">
+                <a:effectLst/>
+                <a:latin typeface="system-ui"/>
+              </a:rPr>
+              <a:t>) Build a Predictive Model for Churn</a:t>
+            </a:r>
+          </a:p>
+          <a:p>
+            <a:pPr algn="l"/>
+            <a:endParaRPr lang="en-US" b="0" i="0" dirty="0">
+              <a:effectLst/>
+              <a:latin typeface="system-ui"/>
+            </a:endParaRPr>
+          </a:p>
+          <a:p>
+            <a:pPr algn="l"/>
+            <a:r>
+              <a:rPr lang="en-US" b="0" i="0" dirty="0">
+                <a:effectLst/>
+                <a:latin typeface="system-ui"/>
+              </a:rPr>
+              <a:t>ii) Gain Insight into Churn Drivers</a:t>
+            </a:r>
+          </a:p>
+          <a:p>
+            <a:pPr algn="l"/>
+            <a:endParaRPr lang="en-US" b="0" i="0" dirty="0">
+              <a:effectLst/>
+              <a:latin typeface="system-ui"/>
+            </a:endParaRPr>
+          </a:p>
+          <a:p>
+            <a:pPr algn="l"/>
+            <a:r>
+              <a:rPr lang="en-US" b="0" i="0" dirty="0">
+                <a:effectLst/>
+                <a:latin typeface="system-ui"/>
+              </a:rPr>
+              <a:t>iii) Provide Strategic Recommendations</a:t>
+            </a:r>
+          </a:p>
+          <a:p>
+            <a:endParaRPr lang="en-US" dirty="0"/>
           </a:p>
         </p:txBody>
       </p:sp>
     </p:spTree>
     <p:extLst>
       <p:ext uri="{BB962C8B-B14F-4D97-AF65-F5344CB8AC3E}">
-        <p14:creationId xmlns:p14="http://schemas.microsoft.com/office/powerpoint/2010/main" val="820051872"/>
+        <p14:creationId xmlns:p14="http://schemas.microsoft.com/office/powerpoint/2010/main" val="532178642"/>
       </p:ext>
     </p:extLst>
   </p:cSld>

</xml_diff>